<commit_message>
Removed non relevant presentation slide.
</commit_message>
<xml_diff>
--- a/javascript_basics/00_Introduction/Introduction.pptx
+++ b/javascript_basics/00_Introduction/Introduction.pptx
@@ -18,9 +18,8 @@
     <p:sldId id="267" r:id="rId12"/>
     <p:sldId id="268" r:id="rId13"/>
     <p:sldId id="269" r:id="rId14"/>
-    <p:sldId id="270" r:id="rId15"/>
-    <p:sldId id="271" r:id="rId16"/>
-    <p:sldId id="260" r:id="rId17"/>
+    <p:sldId id="271" r:id="rId15"/>
+    <p:sldId id="260" r:id="rId16"/>
   </p:sldIdLst>
   <p:sldSz cx="12192000" cy="6858000"/>
   <p:notesSz cx="6858000" cy="9144000"/>
@@ -318,7 +317,7 @@
           <a:p>
             <a:fld id="{09950EE7-4A7F-44FF-B7BA-5B0C64274F05}" type="datetimeFigureOut">
               <a:rPr lang="en-GB" smtClean="0"/>
-              <a:t>09/12/2015</a:t>
+              <a:t>07/03/2016</a:t>
             </a:fld>
             <a:endParaRPr lang="en-GB"/>
           </a:p>
@@ -754,7 +753,7 @@
           <a:p>
             <a:fld id="{09950EE7-4A7F-44FF-B7BA-5B0C64274F05}" type="datetimeFigureOut">
               <a:rPr lang="en-GB" smtClean="0"/>
-              <a:t>09/12/2015</a:t>
+              <a:t>07/03/2016</a:t>
             </a:fld>
             <a:endParaRPr lang="en-GB"/>
           </a:p>
@@ -1004,7 +1003,7 @@
           <a:p>
             <a:fld id="{09950EE7-4A7F-44FF-B7BA-5B0C64274F05}" type="datetimeFigureOut">
               <a:rPr lang="en-GB" smtClean="0"/>
-              <a:t>09/12/2015</a:t>
+              <a:t>07/03/2016</a:t>
             </a:fld>
             <a:endParaRPr lang="en-GB"/>
           </a:p>
@@ -1312,7 +1311,7 @@
           <a:p>
             <a:fld id="{09950EE7-4A7F-44FF-B7BA-5B0C64274F05}" type="datetimeFigureOut">
               <a:rPr lang="en-GB" smtClean="0"/>
-              <a:t>09/12/2015</a:t>
+              <a:t>07/03/2016</a:t>
             </a:fld>
             <a:endParaRPr lang="en-GB"/>
           </a:p>
@@ -1630,7 +1629,7 @@
           <a:p>
             <a:fld id="{09950EE7-4A7F-44FF-B7BA-5B0C64274F05}" type="datetimeFigureOut">
               <a:rPr lang="en-GB" smtClean="0"/>
-              <a:t>09/12/2015</a:t>
+              <a:t>07/03/2016</a:t>
             </a:fld>
             <a:endParaRPr lang="en-GB"/>
           </a:p>
@@ -1932,7 +1931,7 @@
           <a:p>
             <a:fld id="{09950EE7-4A7F-44FF-B7BA-5B0C64274F05}" type="datetimeFigureOut">
               <a:rPr lang="en-GB" smtClean="0"/>
-              <a:t>09/12/2015</a:t>
+              <a:t>07/03/2016</a:t>
             </a:fld>
             <a:endParaRPr lang="en-GB"/>
           </a:p>
@@ -2299,7 +2298,7 @@
           <a:p>
             <a:fld id="{09950EE7-4A7F-44FF-B7BA-5B0C64274F05}" type="datetimeFigureOut">
               <a:rPr lang="en-GB" smtClean="0"/>
-              <a:t>09/12/2015</a:t>
+              <a:t>07/03/2016</a:t>
             </a:fld>
             <a:endParaRPr lang="en-GB"/>
           </a:p>
@@ -2473,7 +2472,7 @@
           <a:p>
             <a:fld id="{09950EE7-4A7F-44FF-B7BA-5B0C64274F05}" type="datetimeFigureOut">
               <a:rPr lang="en-GB" smtClean="0"/>
-              <a:t>09/12/2015</a:t>
+              <a:t>07/03/2016</a:t>
             </a:fld>
             <a:endParaRPr lang="en-GB"/>
           </a:p>
@@ -2653,7 +2652,7 @@
           <a:p>
             <a:fld id="{09950EE7-4A7F-44FF-B7BA-5B0C64274F05}" type="datetimeFigureOut">
               <a:rPr lang="en-GB" smtClean="0"/>
-              <a:t>09/12/2015</a:t>
+              <a:t>07/03/2016</a:t>
             </a:fld>
             <a:endParaRPr lang="en-GB"/>
           </a:p>
@@ -2823,7 +2822,7 @@
           <a:p>
             <a:fld id="{09950EE7-4A7F-44FF-B7BA-5B0C64274F05}" type="datetimeFigureOut">
               <a:rPr lang="en-GB" smtClean="0"/>
-              <a:t>09/12/2015</a:t>
+              <a:t>07/03/2016</a:t>
             </a:fld>
             <a:endParaRPr lang="en-GB"/>
           </a:p>
@@ -3073,7 +3072,7 @@
           <a:p>
             <a:fld id="{09950EE7-4A7F-44FF-B7BA-5B0C64274F05}" type="datetimeFigureOut">
               <a:rPr lang="en-GB" smtClean="0"/>
-              <a:t>09/12/2015</a:t>
+              <a:t>07/03/2016</a:t>
             </a:fld>
             <a:endParaRPr lang="en-GB"/>
           </a:p>
@@ -3309,7 +3308,7 @@
           <a:p>
             <a:fld id="{09950EE7-4A7F-44FF-B7BA-5B0C64274F05}" type="datetimeFigureOut">
               <a:rPr lang="en-GB" smtClean="0"/>
-              <a:t>09/12/2015</a:t>
+              <a:t>07/03/2016</a:t>
             </a:fld>
             <a:endParaRPr lang="en-GB"/>
           </a:p>
@@ -3691,7 +3690,7 @@
           <a:p>
             <a:fld id="{09950EE7-4A7F-44FF-B7BA-5B0C64274F05}" type="datetimeFigureOut">
               <a:rPr lang="en-GB" smtClean="0"/>
-              <a:t>09/12/2015</a:t>
+              <a:t>07/03/2016</a:t>
             </a:fld>
             <a:endParaRPr lang="en-GB"/>
           </a:p>
@@ -3809,7 +3808,7 @@
           <a:p>
             <a:fld id="{09950EE7-4A7F-44FF-B7BA-5B0C64274F05}" type="datetimeFigureOut">
               <a:rPr lang="en-GB" smtClean="0"/>
-              <a:t>09/12/2015</a:t>
+              <a:t>07/03/2016</a:t>
             </a:fld>
             <a:endParaRPr lang="en-GB"/>
           </a:p>
@@ -3904,7 +3903,7 @@
           <a:p>
             <a:fld id="{09950EE7-4A7F-44FF-B7BA-5B0C64274F05}" type="datetimeFigureOut">
               <a:rPr lang="en-GB" smtClean="0"/>
-              <a:t>09/12/2015</a:t>
+              <a:t>07/03/2016</a:t>
             </a:fld>
             <a:endParaRPr lang="en-GB"/>
           </a:p>
@@ -4159,7 +4158,7 @@
           <a:p>
             <a:fld id="{09950EE7-4A7F-44FF-B7BA-5B0C64274F05}" type="datetimeFigureOut">
               <a:rPr lang="en-GB" smtClean="0"/>
-              <a:t>09/12/2015</a:t>
+              <a:t>07/03/2016</a:t>
             </a:fld>
             <a:endParaRPr lang="en-GB"/>
           </a:p>
@@ -4442,7 +4441,7 @@
           <a:p>
             <a:fld id="{09950EE7-4A7F-44FF-B7BA-5B0C64274F05}" type="datetimeFigureOut">
               <a:rPr lang="en-GB" smtClean="0"/>
-              <a:t>09/12/2015</a:t>
+              <a:t>07/03/2016</a:t>
             </a:fld>
             <a:endParaRPr lang="en-GB"/>
           </a:p>
@@ -4848,7 +4847,7 @@
           <a:p>
             <a:fld id="{09950EE7-4A7F-44FF-B7BA-5B0C64274F05}" type="datetimeFigureOut">
               <a:rPr lang="en-GB" smtClean="0"/>
-              <a:t>09/12/2015</a:t>
+              <a:t>07/03/2016</a:t>
             </a:fld>
             <a:endParaRPr lang="en-GB"/>
           </a:p>
@@ -5506,11 +5505,7 @@
             </a:r>
             <a:r>
               <a:rPr lang="en-US" dirty="0" smtClean="0"/>
-              <a:t>Manipulation presentation </a:t>
-            </a:r>
-            <a:r>
-              <a:rPr lang="en-US" dirty="0" smtClean="0"/>
-              <a:t>covers:</a:t>
+              <a:t>Manipulation presentation covers:</a:t>
             </a:r>
           </a:p>
           <a:p>
@@ -5526,7 +5521,6 @@
               <a:rPr lang="en-US" dirty="0" smtClean="0"/>
               <a:t>jQuery manipulation (selectors &amp; functions)</a:t>
             </a:r>
-            <a:endParaRPr lang="en-US" dirty="0" smtClean="0"/>
           </a:p>
         </p:txBody>
       </p:sp>
@@ -5691,11 +5685,7 @@
             </a:r>
             <a:r>
               <a:rPr lang="en-US" dirty="0" smtClean="0"/>
-              <a:t>presentation </a:t>
-            </a:r>
-            <a:r>
-              <a:rPr lang="en-US" dirty="0" smtClean="0"/>
-              <a:t>covers JavaScript’s prototypical inheritance, different ways to create new objects and how </a:t>
+              <a:t>presentation covers JavaScript’s prototypical inheritance, different ways to create new objects and how </a:t>
             </a:r>
             <a:r>
               <a:rPr lang="en-US" dirty="0" err="1" smtClean="0"/>
@@ -5866,86 +5856,6 @@
           <a:p>
             <a:r>
               <a:rPr lang="en-US" b="1" dirty="0"/>
-              <a:t>Best practices</a:t>
-            </a:r>
-            <a:endParaRPr lang="en-GB" b="1" dirty="0"/>
-          </a:p>
-        </p:txBody>
-      </p:sp>
-      <p:sp>
-        <p:nvSpPr>
-          <p:cNvPr id="3" name="Content Placeholder 2"/>
-          <p:cNvSpPr>
-            <a:spLocks noGrp="1"/>
-          </p:cNvSpPr>
-          <p:nvPr>
-            <p:ph idx="1"/>
-          </p:nvPr>
-        </p:nvSpPr>
-        <p:spPr/>
-        <p:txBody>
-          <a:bodyPr/>
-          <a:lstStyle/>
-          <a:p>
-            <a:r>
-              <a:rPr lang="en-US" dirty="0"/>
-              <a:t>Best </a:t>
-            </a:r>
-            <a:r>
-              <a:rPr lang="en-US" dirty="0" smtClean="0"/>
-              <a:t>practices presentation provides a basic guideline on how to organize and write HTML, CSS and JavaScript code.</a:t>
-            </a:r>
-            <a:endParaRPr lang="en-US" dirty="0" smtClean="0"/>
-          </a:p>
-        </p:txBody>
-      </p:sp>
-    </p:spTree>
-    <p:extLst>
-      <p:ext uri="{BB962C8B-B14F-4D97-AF65-F5344CB8AC3E}">
-        <p14:creationId xmlns:p14="http://schemas.microsoft.com/office/powerpoint/2010/main" val="1196238875"/>
-      </p:ext>
-    </p:extLst>
-  </p:cSld>
-  <p:clrMapOvr>
-    <a:masterClrMapping/>
-  </p:clrMapOvr>
-</p:sld>
-</file>
-
-<file path=ppt/slides/slide15.xml><?xml version="1.0" encoding="utf-8"?>
-<p:sld xmlns:a="http://schemas.openxmlformats.org/drawingml/2006/main" xmlns:r="http://schemas.openxmlformats.org/officeDocument/2006/relationships" xmlns:p="http://schemas.openxmlformats.org/presentationml/2006/main">
-  <p:cSld>
-    <p:spTree>
-      <p:nvGrpSpPr>
-        <p:cNvPr id="1" name=""/>
-        <p:cNvGrpSpPr/>
-        <p:nvPr/>
-      </p:nvGrpSpPr>
-      <p:grpSpPr>
-        <a:xfrm>
-          <a:off x="0" y="0"/>
-          <a:ext cx="0" cy="0"/>
-          <a:chOff x="0" y="0"/>
-          <a:chExt cx="0" cy="0"/>
-        </a:xfrm>
-      </p:grpSpPr>
-      <p:sp>
-        <p:nvSpPr>
-          <p:cNvPr id="2" name="Title 1"/>
-          <p:cNvSpPr>
-            <a:spLocks noGrp="1"/>
-          </p:cNvSpPr>
-          <p:nvPr>
-            <p:ph type="title"/>
-          </p:nvPr>
-        </p:nvSpPr>
-        <p:spPr/>
-        <p:txBody>
-          <a:bodyPr/>
-          <a:lstStyle/>
-          <a:p>
-            <a:r>
-              <a:rPr lang="en-US" b="1" dirty="0"/>
               <a:t>Debugging</a:t>
             </a:r>
             <a:endParaRPr lang="en-GB" b="1" dirty="0"/>
@@ -6032,7 +5942,7 @@
 </p:sld>
 </file>
 
-<file path=ppt/slides/slide16.xml><?xml version="1.0" encoding="utf-8"?>
+<file path=ppt/slides/slide15.xml><?xml version="1.0" encoding="utf-8"?>
 <p:sld xmlns:a="http://schemas.openxmlformats.org/drawingml/2006/main" xmlns:r="http://schemas.openxmlformats.org/officeDocument/2006/relationships" xmlns:p="http://schemas.openxmlformats.org/presentationml/2006/main">
   <p:cSld>
     <p:spTree>
@@ -6201,11 +6111,7 @@
           <a:p>
             <a:r>
               <a:rPr lang="en-GB" sz="1800" dirty="0" smtClean="0"/>
-              <a:t>This course was created for new developers </a:t>
-            </a:r>
-            <a:r>
-              <a:rPr lang="en-GB" sz="1800" dirty="0" smtClean="0"/>
-              <a:t>who have less experience </a:t>
+              <a:t>This course was created for new developers who have less experience </a:t>
             </a:r>
             <a:r>
               <a:rPr lang="en-GB" sz="1800" dirty="0"/>
@@ -6244,11 +6150,7 @@
             <a:pPr lvl="1"/>
             <a:r>
               <a:rPr lang="en-GB" sz="1600" dirty="0" smtClean="0"/>
-              <a:t>The </a:t>
-            </a:r>
-            <a:r>
-              <a:rPr lang="en-GB" sz="1600" dirty="0" smtClean="0"/>
-              <a:t>basic </a:t>
+              <a:t>The basic </a:t>
             </a:r>
             <a:r>
               <a:rPr lang="en-GB" sz="1600" dirty="0"/>
@@ -6429,7 +6331,6 @@
               <a:rPr lang="en-GB" dirty="0" smtClean="0"/>
               <a:t>You will need the following tools:</a:t>
             </a:r>
-            <a:endParaRPr lang="en-GB" dirty="0" smtClean="0"/>
           </a:p>
           <a:p>
             <a:pPr lvl="1"/>
@@ -6454,13 +6355,8 @@
             </a:r>
             <a:r>
               <a:rPr lang="en-GB" dirty="0" smtClean="0"/>
-              <a:t>or a different text editor/ </a:t>
-            </a:r>
-            <a:r>
-              <a:rPr lang="en-GB" dirty="0" smtClean="0"/>
-              <a:t>IDE with JavaScript syntax support</a:t>
-            </a:r>
-            <a:endParaRPr lang="en-GB" dirty="0" smtClean="0"/>
+              <a:t>or a different text editor/ IDE with JavaScript syntax support</a:t>
+            </a:r>
           </a:p>
           <a:p>
             <a:pPr lvl="1"/>
@@ -6603,27 +6499,8 @@
                   </a:schemeClr>
                 </a:solidFill>
               </a:rPr>
-              <a:t>At the end of each presentations is an </a:t>
-            </a:r>
-            <a:r>
-              <a:rPr lang="en-GB" dirty="0" smtClean="0">
-                <a:solidFill>
-                  <a:schemeClr val="bg1">
-                    <a:lumMod val="75000"/>
-                    <a:lumOff val="25000"/>
-                  </a:schemeClr>
-                </a:solidFill>
-              </a:rPr>
-              <a:t>exercise you should try to solve</a:t>
-            </a:r>
-            <a:endParaRPr lang="en-GB" dirty="0" smtClean="0">
-              <a:solidFill>
-                <a:schemeClr val="bg1">
-                  <a:lumMod val="75000"/>
-                  <a:lumOff val="25000"/>
-                </a:schemeClr>
-              </a:solidFill>
-            </a:endParaRPr>
+              <a:t>At the end of each presentations is an exercise you should try to solve</a:t>
+            </a:r>
           </a:p>
           <a:p>
             <a:endParaRPr lang="en-GB" dirty="0" smtClean="0">
@@ -6761,17 +6638,8 @@
           <a:p>
             <a:r>
               <a:rPr lang="en-US" dirty="0" smtClean="0"/>
-              <a:t>This course covers the  </a:t>
-            </a:r>
-            <a:r>
-              <a:rPr lang="en-US" dirty="0" smtClean="0"/>
-              <a:t>following </a:t>
-            </a:r>
-            <a:r>
-              <a:rPr lang="en-US" dirty="0" smtClean="0"/>
-              <a:t>topics:</a:t>
-            </a:r>
-            <a:endParaRPr lang="en-US" dirty="0" smtClean="0"/>
+              <a:t>This course covers the  following topics:</a:t>
+            </a:r>
           </a:p>
           <a:p>
             <a:pPr lvl="1"/>
@@ -6953,23 +6821,7 @@
           <a:p>
             <a:r>
               <a:rPr lang="en-US" dirty="0" smtClean="0"/>
-              <a:t>JavaScript basics presentation </a:t>
-            </a:r>
-            <a:r>
-              <a:rPr lang="en-US" dirty="0" smtClean="0"/>
-              <a:t>c</a:t>
-            </a:r>
-            <a:r>
-              <a:rPr lang="en-US" dirty="0" smtClean="0"/>
-              <a:t>overs the basic functionalities of the language </a:t>
-            </a:r>
-            <a:r>
-              <a:rPr lang="en-US" dirty="0" smtClean="0"/>
-              <a:t>by </a:t>
-            </a:r>
-            <a:r>
-              <a:rPr lang="en-US" dirty="0" smtClean="0"/>
-              <a:t>ECMAScript 5 specifications.</a:t>
+              <a:t>JavaScript basics presentation covers the basic functionalities of the language by ECMAScript 5 specifications.</a:t>
             </a:r>
           </a:p>
           <a:p>
@@ -7077,11 +6929,7 @@
           <a:p>
             <a:r>
               <a:rPr lang="en-US" dirty="0" smtClean="0"/>
-              <a:t>JS standard library presentation </a:t>
-            </a:r>
-            <a:r>
-              <a:rPr lang="en-US" dirty="0" smtClean="0"/>
-              <a:t>covers </a:t>
+              <a:t>JS standard library presentation covers </a:t>
             </a:r>
             <a:r>
               <a:rPr lang="en-US" dirty="0"/>
@@ -7198,11 +7046,7 @@
             </a:r>
             <a:r>
               <a:rPr lang="en-US" dirty="0" smtClean="0"/>
-              <a:t>and the HTML </a:t>
-            </a:r>
-            <a:r>
-              <a:rPr lang="en-US" dirty="0" smtClean="0"/>
-              <a:t>forms.</a:t>
+              <a:t>and the HTML forms.</a:t>
             </a:r>
           </a:p>
           <a:p>
@@ -7210,7 +7054,6 @@
               <a:rPr lang="en-US" dirty="0" smtClean="0"/>
               <a:t>The presentation gives a very basic overview of how web pages should be structured and how styling can be applied.</a:t>
             </a:r>
-            <a:endParaRPr lang="en-US" dirty="0" smtClean="0"/>
           </a:p>
           <a:p>
             <a:endParaRPr lang="en-US" dirty="0"/>
@@ -7294,15 +7137,7 @@
           <a:p>
             <a:r>
               <a:rPr lang="en-US" dirty="0" smtClean="0"/>
-              <a:t>JS functions presentation covers how functions can be declared</a:t>
-            </a:r>
-            <a:r>
-              <a:rPr lang="en-US" dirty="0" smtClean="0"/>
-              <a:t>, gives an overview of closures</a:t>
-            </a:r>
-            <a:r>
-              <a:rPr lang="en-US" dirty="0" smtClean="0"/>
-              <a:t>, scopes higher order functions.</a:t>
+              <a:t>JS functions presentation covers how functions can be declared, gives an overview of closures, scopes higher order functions.</a:t>
             </a:r>
           </a:p>
           <a:p>
@@ -7310,7 +7145,6 @@
               <a:rPr lang="en-US" dirty="0" smtClean="0"/>
               <a:t>This presentation should give an insight on how JavaScript functions are different from functions in other programming languages.</a:t>
             </a:r>
-            <a:endParaRPr lang="en-US" dirty="0" smtClean="0"/>
           </a:p>
         </p:txBody>
       </p:sp>

</xml_diff>

<commit_message>
fixed small typo in js basics presentation
</commit_message>
<xml_diff>
--- a/javascript_basics/00_Introduction/Introduction.pptx
+++ b/javascript_basics/00_Introduction/Introduction.pptx
@@ -317,7 +317,7 @@
           <a:p>
             <a:fld id="{09950EE7-4A7F-44FF-B7BA-5B0C64274F05}" type="datetimeFigureOut">
               <a:rPr lang="en-GB" smtClean="0"/>
-              <a:t>07/03/2016</a:t>
+              <a:t>21/11/2016</a:t>
             </a:fld>
             <a:endParaRPr lang="en-GB"/>
           </a:p>
@@ -753,7 +753,7 @@
           <a:p>
             <a:fld id="{09950EE7-4A7F-44FF-B7BA-5B0C64274F05}" type="datetimeFigureOut">
               <a:rPr lang="en-GB" smtClean="0"/>
-              <a:t>07/03/2016</a:t>
+              <a:t>21/11/2016</a:t>
             </a:fld>
             <a:endParaRPr lang="en-GB"/>
           </a:p>
@@ -1003,7 +1003,7 @@
           <a:p>
             <a:fld id="{09950EE7-4A7F-44FF-B7BA-5B0C64274F05}" type="datetimeFigureOut">
               <a:rPr lang="en-GB" smtClean="0"/>
-              <a:t>07/03/2016</a:t>
+              <a:t>21/11/2016</a:t>
             </a:fld>
             <a:endParaRPr lang="en-GB"/>
           </a:p>
@@ -1311,7 +1311,7 @@
           <a:p>
             <a:fld id="{09950EE7-4A7F-44FF-B7BA-5B0C64274F05}" type="datetimeFigureOut">
               <a:rPr lang="en-GB" smtClean="0"/>
-              <a:t>07/03/2016</a:t>
+              <a:t>21/11/2016</a:t>
             </a:fld>
             <a:endParaRPr lang="en-GB"/>
           </a:p>
@@ -1629,7 +1629,7 @@
           <a:p>
             <a:fld id="{09950EE7-4A7F-44FF-B7BA-5B0C64274F05}" type="datetimeFigureOut">
               <a:rPr lang="en-GB" smtClean="0"/>
-              <a:t>07/03/2016</a:t>
+              <a:t>21/11/2016</a:t>
             </a:fld>
             <a:endParaRPr lang="en-GB"/>
           </a:p>
@@ -1931,7 +1931,7 @@
           <a:p>
             <a:fld id="{09950EE7-4A7F-44FF-B7BA-5B0C64274F05}" type="datetimeFigureOut">
               <a:rPr lang="en-GB" smtClean="0"/>
-              <a:t>07/03/2016</a:t>
+              <a:t>21/11/2016</a:t>
             </a:fld>
             <a:endParaRPr lang="en-GB"/>
           </a:p>
@@ -2298,7 +2298,7 @@
           <a:p>
             <a:fld id="{09950EE7-4A7F-44FF-B7BA-5B0C64274F05}" type="datetimeFigureOut">
               <a:rPr lang="en-GB" smtClean="0"/>
-              <a:t>07/03/2016</a:t>
+              <a:t>21/11/2016</a:t>
             </a:fld>
             <a:endParaRPr lang="en-GB"/>
           </a:p>
@@ -2472,7 +2472,7 @@
           <a:p>
             <a:fld id="{09950EE7-4A7F-44FF-B7BA-5B0C64274F05}" type="datetimeFigureOut">
               <a:rPr lang="en-GB" smtClean="0"/>
-              <a:t>07/03/2016</a:t>
+              <a:t>21/11/2016</a:t>
             </a:fld>
             <a:endParaRPr lang="en-GB"/>
           </a:p>
@@ -2652,7 +2652,7 @@
           <a:p>
             <a:fld id="{09950EE7-4A7F-44FF-B7BA-5B0C64274F05}" type="datetimeFigureOut">
               <a:rPr lang="en-GB" smtClean="0"/>
-              <a:t>07/03/2016</a:t>
+              <a:t>21/11/2016</a:t>
             </a:fld>
             <a:endParaRPr lang="en-GB"/>
           </a:p>
@@ -2822,7 +2822,7 @@
           <a:p>
             <a:fld id="{09950EE7-4A7F-44FF-B7BA-5B0C64274F05}" type="datetimeFigureOut">
               <a:rPr lang="en-GB" smtClean="0"/>
-              <a:t>07/03/2016</a:t>
+              <a:t>21/11/2016</a:t>
             </a:fld>
             <a:endParaRPr lang="en-GB"/>
           </a:p>
@@ -3072,7 +3072,7 @@
           <a:p>
             <a:fld id="{09950EE7-4A7F-44FF-B7BA-5B0C64274F05}" type="datetimeFigureOut">
               <a:rPr lang="en-GB" smtClean="0"/>
-              <a:t>07/03/2016</a:t>
+              <a:t>21/11/2016</a:t>
             </a:fld>
             <a:endParaRPr lang="en-GB"/>
           </a:p>
@@ -3308,7 +3308,7 @@
           <a:p>
             <a:fld id="{09950EE7-4A7F-44FF-B7BA-5B0C64274F05}" type="datetimeFigureOut">
               <a:rPr lang="en-GB" smtClean="0"/>
-              <a:t>07/03/2016</a:t>
+              <a:t>21/11/2016</a:t>
             </a:fld>
             <a:endParaRPr lang="en-GB"/>
           </a:p>
@@ -3690,7 +3690,7 @@
           <a:p>
             <a:fld id="{09950EE7-4A7F-44FF-B7BA-5B0C64274F05}" type="datetimeFigureOut">
               <a:rPr lang="en-GB" smtClean="0"/>
-              <a:t>07/03/2016</a:t>
+              <a:t>21/11/2016</a:t>
             </a:fld>
             <a:endParaRPr lang="en-GB"/>
           </a:p>
@@ -3808,7 +3808,7 @@
           <a:p>
             <a:fld id="{09950EE7-4A7F-44FF-B7BA-5B0C64274F05}" type="datetimeFigureOut">
               <a:rPr lang="en-GB" smtClean="0"/>
-              <a:t>07/03/2016</a:t>
+              <a:t>21/11/2016</a:t>
             </a:fld>
             <a:endParaRPr lang="en-GB"/>
           </a:p>
@@ -3903,7 +3903,7 @@
           <a:p>
             <a:fld id="{09950EE7-4A7F-44FF-B7BA-5B0C64274F05}" type="datetimeFigureOut">
               <a:rPr lang="en-GB" smtClean="0"/>
-              <a:t>07/03/2016</a:t>
+              <a:t>21/11/2016</a:t>
             </a:fld>
             <a:endParaRPr lang="en-GB"/>
           </a:p>
@@ -4158,7 +4158,7 @@
           <a:p>
             <a:fld id="{09950EE7-4A7F-44FF-B7BA-5B0C64274F05}" type="datetimeFigureOut">
               <a:rPr lang="en-GB" smtClean="0"/>
-              <a:t>07/03/2016</a:t>
+              <a:t>21/11/2016</a:t>
             </a:fld>
             <a:endParaRPr lang="en-GB"/>
           </a:p>
@@ -4441,7 +4441,7 @@
           <a:p>
             <a:fld id="{09950EE7-4A7F-44FF-B7BA-5B0C64274F05}" type="datetimeFigureOut">
               <a:rPr lang="en-GB" smtClean="0"/>
-              <a:t>07/03/2016</a:t>
+              <a:t>21/11/2016</a:t>
             </a:fld>
             <a:endParaRPr lang="en-GB"/>
           </a:p>
@@ -4847,7 +4847,7 @@
           <a:p>
             <a:fld id="{09950EE7-4A7F-44FF-B7BA-5B0C64274F05}" type="datetimeFigureOut">
               <a:rPr lang="en-GB" smtClean="0"/>
-              <a:t>07/03/2016</a:t>
+              <a:t>21/11/2016</a:t>
             </a:fld>
             <a:endParaRPr lang="en-GB"/>
           </a:p>
@@ -7137,7 +7137,15 @@
           <a:p>
             <a:r>
               <a:rPr lang="en-US" dirty="0" smtClean="0"/>
-              <a:t>JS functions presentation covers how functions can be declared, gives an overview of closures, scopes higher order functions.</a:t>
+              <a:t>JS functions presentation covers how functions can be declared, gives an overview of closures, </a:t>
+            </a:r>
+            <a:r>
+              <a:rPr lang="en-US" dirty="0" smtClean="0"/>
+              <a:t>scopes and </a:t>
+            </a:r>
+            <a:r>
+              <a:rPr lang="en-US" dirty="0" smtClean="0"/>
+              <a:t>higher order functions.</a:t>
             </a:r>
           </a:p>
           <a:p>

</xml_diff>

<commit_message>
Added missing names to js basics presentation.
</commit_message>
<xml_diff>
--- a/javascript_basics/00_Introduction/Introduction.pptx
+++ b/javascript_basics/00_Introduction/Introduction.pptx
@@ -6026,9 +6026,23 @@
               <a:t>Spuzic </a:t>
             </a:r>
             <a:r>
-              <a:rPr lang="en-GB" dirty="0"/>
+              <a:rPr lang="en-GB" dirty="0" smtClean="0"/>
               <a:t>Nenad</a:t>
             </a:r>
+            <a:endParaRPr lang="sr-Latn-CS" dirty="0" smtClean="0"/>
+          </a:p>
+          <a:p>
+            <a:r>
+              <a:rPr lang="sr-Latn-CS" dirty="0" smtClean="0"/>
+              <a:t>Janko Sokolovic</a:t>
+            </a:r>
+          </a:p>
+          <a:p>
+            <a:r>
+              <a:rPr lang="sr-Latn-CS" smtClean="0"/>
+              <a:t>Ognjen Kurtic</a:t>
+            </a:r>
+            <a:endParaRPr lang="en-GB" dirty="0"/>
           </a:p>
         </p:txBody>
       </p:sp>
@@ -7137,15 +7151,7 @@
           <a:p>
             <a:r>
               <a:rPr lang="en-US" dirty="0" smtClean="0"/>
-              <a:t>JS functions presentation covers how functions can be declared, gives an overview of closures, </a:t>
-            </a:r>
-            <a:r>
-              <a:rPr lang="en-US" dirty="0" smtClean="0"/>
-              <a:t>scopes and </a:t>
-            </a:r>
-            <a:r>
-              <a:rPr lang="en-US" dirty="0" smtClean="0"/>
-              <a:t>higher order functions.</a:t>
+              <a:t>JS functions presentation covers how functions can be declared, gives an overview of closures, scopes and higher order functions.</a:t>
             </a:r>
           </a:p>
           <a:p>

</xml_diff>

<commit_message>
Restructured lessons to be consistent - deletion
</commit_message>
<xml_diff>
--- a/javascript_basics/00_Introduction/Introduction.pptx
+++ b/javascript_basics/00_Introduction/Introduction.pptx
@@ -19,7 +19,8 @@
     <p:sldId id="268" r:id="rId13"/>
     <p:sldId id="269" r:id="rId14"/>
     <p:sldId id="271" r:id="rId15"/>
-    <p:sldId id="260" r:id="rId16"/>
+    <p:sldId id="274" r:id="rId16"/>
+    <p:sldId id="260" r:id="rId17"/>
   </p:sldIdLst>
   <p:sldSz cx="12192000" cy="6858000"/>
   <p:notesSz cx="6858000" cy="9144000"/>
@@ -317,7 +318,7 @@
           <a:p>
             <a:fld id="{09950EE7-4A7F-44FF-B7BA-5B0C64274F05}" type="datetimeFigureOut">
               <a:rPr lang="en-GB" smtClean="0"/>
-              <a:t>07/07/2017</a:t>
+              <a:t>30/11/2017</a:t>
             </a:fld>
             <a:endParaRPr lang="en-GB"/>
           </a:p>
@@ -753,7 +754,7 @@
           <a:p>
             <a:fld id="{09950EE7-4A7F-44FF-B7BA-5B0C64274F05}" type="datetimeFigureOut">
               <a:rPr lang="en-GB" smtClean="0"/>
-              <a:t>07/07/2017</a:t>
+              <a:t>30/11/2017</a:t>
             </a:fld>
             <a:endParaRPr lang="en-GB"/>
           </a:p>
@@ -1003,7 +1004,7 @@
           <a:p>
             <a:fld id="{09950EE7-4A7F-44FF-B7BA-5B0C64274F05}" type="datetimeFigureOut">
               <a:rPr lang="en-GB" smtClean="0"/>
-              <a:t>07/07/2017</a:t>
+              <a:t>30/11/2017</a:t>
             </a:fld>
             <a:endParaRPr lang="en-GB"/>
           </a:p>
@@ -1311,7 +1312,7 @@
           <a:p>
             <a:fld id="{09950EE7-4A7F-44FF-B7BA-5B0C64274F05}" type="datetimeFigureOut">
               <a:rPr lang="en-GB" smtClean="0"/>
-              <a:t>07/07/2017</a:t>
+              <a:t>30/11/2017</a:t>
             </a:fld>
             <a:endParaRPr lang="en-GB"/>
           </a:p>
@@ -1629,7 +1630,7 @@
           <a:p>
             <a:fld id="{09950EE7-4A7F-44FF-B7BA-5B0C64274F05}" type="datetimeFigureOut">
               <a:rPr lang="en-GB" smtClean="0"/>
-              <a:t>07/07/2017</a:t>
+              <a:t>30/11/2017</a:t>
             </a:fld>
             <a:endParaRPr lang="en-GB"/>
           </a:p>
@@ -1931,7 +1932,7 @@
           <a:p>
             <a:fld id="{09950EE7-4A7F-44FF-B7BA-5B0C64274F05}" type="datetimeFigureOut">
               <a:rPr lang="en-GB" smtClean="0"/>
-              <a:t>07/07/2017</a:t>
+              <a:t>30/11/2017</a:t>
             </a:fld>
             <a:endParaRPr lang="en-GB"/>
           </a:p>
@@ -2298,7 +2299,7 @@
           <a:p>
             <a:fld id="{09950EE7-4A7F-44FF-B7BA-5B0C64274F05}" type="datetimeFigureOut">
               <a:rPr lang="en-GB" smtClean="0"/>
-              <a:t>07/07/2017</a:t>
+              <a:t>30/11/2017</a:t>
             </a:fld>
             <a:endParaRPr lang="en-GB"/>
           </a:p>
@@ -2472,7 +2473,7 @@
           <a:p>
             <a:fld id="{09950EE7-4A7F-44FF-B7BA-5B0C64274F05}" type="datetimeFigureOut">
               <a:rPr lang="en-GB" smtClean="0"/>
-              <a:t>07/07/2017</a:t>
+              <a:t>30/11/2017</a:t>
             </a:fld>
             <a:endParaRPr lang="en-GB"/>
           </a:p>
@@ -2652,7 +2653,7 @@
           <a:p>
             <a:fld id="{09950EE7-4A7F-44FF-B7BA-5B0C64274F05}" type="datetimeFigureOut">
               <a:rPr lang="en-GB" smtClean="0"/>
-              <a:t>07/07/2017</a:t>
+              <a:t>30/11/2017</a:t>
             </a:fld>
             <a:endParaRPr lang="en-GB"/>
           </a:p>
@@ -2822,7 +2823,7 @@
           <a:p>
             <a:fld id="{09950EE7-4A7F-44FF-B7BA-5B0C64274F05}" type="datetimeFigureOut">
               <a:rPr lang="en-GB" smtClean="0"/>
-              <a:t>07/07/2017</a:t>
+              <a:t>30/11/2017</a:t>
             </a:fld>
             <a:endParaRPr lang="en-GB"/>
           </a:p>
@@ -3072,7 +3073,7 @@
           <a:p>
             <a:fld id="{09950EE7-4A7F-44FF-B7BA-5B0C64274F05}" type="datetimeFigureOut">
               <a:rPr lang="en-GB" smtClean="0"/>
-              <a:t>07/07/2017</a:t>
+              <a:t>30/11/2017</a:t>
             </a:fld>
             <a:endParaRPr lang="en-GB"/>
           </a:p>
@@ -3308,7 +3309,7 @@
           <a:p>
             <a:fld id="{09950EE7-4A7F-44FF-B7BA-5B0C64274F05}" type="datetimeFigureOut">
               <a:rPr lang="en-GB" smtClean="0"/>
-              <a:t>07/07/2017</a:t>
+              <a:t>30/11/2017</a:t>
             </a:fld>
             <a:endParaRPr lang="en-GB"/>
           </a:p>
@@ -3690,7 +3691,7 @@
           <a:p>
             <a:fld id="{09950EE7-4A7F-44FF-B7BA-5B0C64274F05}" type="datetimeFigureOut">
               <a:rPr lang="en-GB" smtClean="0"/>
-              <a:t>07/07/2017</a:t>
+              <a:t>30/11/2017</a:t>
             </a:fld>
             <a:endParaRPr lang="en-GB"/>
           </a:p>
@@ -3808,7 +3809,7 @@
           <a:p>
             <a:fld id="{09950EE7-4A7F-44FF-B7BA-5B0C64274F05}" type="datetimeFigureOut">
               <a:rPr lang="en-GB" smtClean="0"/>
-              <a:t>07/07/2017</a:t>
+              <a:t>30/11/2017</a:t>
             </a:fld>
             <a:endParaRPr lang="en-GB"/>
           </a:p>
@@ -3903,7 +3904,7 @@
           <a:p>
             <a:fld id="{09950EE7-4A7F-44FF-B7BA-5B0C64274F05}" type="datetimeFigureOut">
               <a:rPr lang="en-GB" smtClean="0"/>
-              <a:t>07/07/2017</a:t>
+              <a:t>30/11/2017</a:t>
             </a:fld>
             <a:endParaRPr lang="en-GB"/>
           </a:p>
@@ -4158,7 +4159,7 @@
           <a:p>
             <a:fld id="{09950EE7-4A7F-44FF-B7BA-5B0C64274F05}" type="datetimeFigureOut">
               <a:rPr lang="en-GB" smtClean="0"/>
-              <a:t>07/07/2017</a:t>
+              <a:t>30/11/2017</a:t>
             </a:fld>
             <a:endParaRPr lang="en-GB"/>
           </a:p>
@@ -4441,7 +4442,7 @@
           <a:p>
             <a:fld id="{09950EE7-4A7F-44FF-B7BA-5B0C64274F05}" type="datetimeFigureOut">
               <a:rPr lang="en-GB" smtClean="0"/>
-              <a:t>07/07/2017</a:t>
+              <a:t>30/11/2017</a:t>
             </a:fld>
             <a:endParaRPr lang="en-GB"/>
           </a:p>
@@ -4847,7 +4848,7 @@
           <a:p>
             <a:fld id="{09950EE7-4A7F-44FF-B7BA-5B0C64274F05}" type="datetimeFigureOut">
               <a:rPr lang="en-GB" smtClean="0"/>
-              <a:t>07/07/2017</a:t>
+              <a:t>30/11/2017</a:t>
             </a:fld>
             <a:endParaRPr lang="en-GB"/>
           </a:p>
@@ -6003,6 +6004,70 @@
           <a:lstStyle/>
           <a:p>
             <a:r>
+              <a:rPr lang="en-GB" dirty="0"/>
+              <a:t>Present </a:t>
+            </a:r>
+            <a:r>
+              <a:rPr lang="en-GB" dirty="0" err="1"/>
+              <a:t>hello_world</a:t>
+            </a:r>
+            <a:r>
+              <a:rPr lang="en-GB" dirty="0"/>
+              <a:t/>
+            </a:r>
+            <a:br>
+              <a:rPr lang="en-GB" dirty="0"/>
+            </a:br>
+            <a:endParaRPr lang="en-GB" dirty="0"/>
+          </a:p>
+        </p:txBody>
+      </p:sp>
+    </p:spTree>
+    <p:extLst>
+      <p:ext uri="{BB962C8B-B14F-4D97-AF65-F5344CB8AC3E}">
+        <p14:creationId xmlns:p14="http://schemas.microsoft.com/office/powerpoint/2010/main" val="2036734878"/>
+      </p:ext>
+    </p:extLst>
+  </p:cSld>
+  <p:clrMapOvr>
+    <a:masterClrMapping/>
+  </p:clrMapOvr>
+</p:sld>
+</file>
+
+<file path=ppt/slides/slide16.xml><?xml version="1.0" encoding="utf-8"?>
+<p:sld xmlns:a="http://schemas.openxmlformats.org/drawingml/2006/main" xmlns:r="http://schemas.openxmlformats.org/officeDocument/2006/relationships" xmlns:p="http://schemas.openxmlformats.org/presentationml/2006/main">
+  <p:cSld>
+    <p:spTree>
+      <p:nvGrpSpPr>
+        <p:cNvPr id="1" name=""/>
+        <p:cNvGrpSpPr/>
+        <p:nvPr/>
+      </p:nvGrpSpPr>
+      <p:grpSpPr>
+        <a:xfrm>
+          <a:off x="0" y="0"/>
+          <a:ext cx="0" cy="0"/>
+          <a:chOff x="0" y="0"/>
+          <a:chExt cx="0" cy="0"/>
+        </a:xfrm>
+      </p:grpSpPr>
+      <p:sp>
+        <p:nvSpPr>
+          <p:cNvPr id="2" name="Title 1"/>
+          <p:cNvSpPr>
+            <a:spLocks noGrp="1"/>
+          </p:cNvSpPr>
+          <p:nvPr>
+            <p:ph type="title"/>
+          </p:nvPr>
+        </p:nvSpPr>
+        <p:spPr/>
+        <p:txBody>
+          <a:bodyPr/>
+          <a:lstStyle/>
+          <a:p>
+            <a:r>
               <a:rPr lang="en-GB" b="1" dirty="0" smtClean="0"/>
               <a:t>contact</a:t>
             </a:r>
@@ -6045,11 +6110,7 @@
           <a:p>
             <a:r>
               <a:rPr lang="en-GB" smtClean="0"/>
-              <a:t>Starcevic </a:t>
-            </a:r>
-            <a:r>
-              <a:rPr lang="en-GB" smtClean="0"/>
-              <a:t>Milan</a:t>
+              <a:t>Starcevic Milan</a:t>
             </a:r>
             <a:endParaRPr lang="sr-Latn-CS" dirty="0" smtClean="0"/>
           </a:p>
@@ -6062,11 +6123,7 @@
           <a:p>
             <a:r>
               <a:rPr lang="sr-Latn-CS" smtClean="0"/>
-              <a:t>Ognjen </a:t>
-            </a:r>
-            <a:r>
-              <a:rPr lang="sr-Latn-CS" smtClean="0"/>
-              <a:t>Kurtic</a:t>
+              <a:t>Ognjen Kurtic</a:t>
             </a:r>
             <a:endParaRPr lang="en-US" smtClean="0"/>
           </a:p>

</xml_diff>